<commit_message>
Uploaded Lesson 3 materials (inc Lesson 2 completed exercises)
</commit_message>
<xml_diff>
--- a/Python Level 2/Lesson 3/Session 3.pptx
+++ b/Python Level 2/Lesson 3/Session 3.pptx
@@ -5,7 +5,7 @@
     <p:sldMasterId id="2147483648" r:id="rId1"/>
   </p:sldMasterIdLst>
   <p:notesMasterIdLst>
-    <p:notesMasterId r:id="rId13"/>
+    <p:notesMasterId r:id="rId14"/>
   </p:notesMasterIdLst>
   <p:sldIdLst>
     <p:sldId id="256" r:id="rId2"/>
@@ -13,12 +13,13 @@
     <p:sldId id="269" r:id="rId4"/>
     <p:sldId id="270" r:id="rId5"/>
     <p:sldId id="271" r:id="rId6"/>
-    <p:sldId id="272" r:id="rId7"/>
-    <p:sldId id="274" r:id="rId8"/>
-    <p:sldId id="275" r:id="rId9"/>
-    <p:sldId id="276" r:id="rId10"/>
-    <p:sldId id="277" r:id="rId11"/>
-    <p:sldId id="267" r:id="rId12"/>
+    <p:sldId id="278" r:id="rId7"/>
+    <p:sldId id="272" r:id="rId8"/>
+    <p:sldId id="274" r:id="rId9"/>
+    <p:sldId id="275" r:id="rId10"/>
+    <p:sldId id="276" r:id="rId11"/>
+    <p:sldId id="277" r:id="rId12"/>
+    <p:sldId id="267" r:id="rId13"/>
   </p:sldIdLst>
   <p:sldSz cx="12192000" cy="6858000"/>
   <p:notesSz cx="6858000" cy="9144000"/>
@@ -207,7 +208,7 @@
           <a:p>
             <a:fld id="{A1609144-CA2D-5B42-9245-4141F5EB8897}" type="datetimeFigureOut">
               <a:rPr lang="en-US" smtClean="0"/>
-              <a:t>10/3/16</a:t>
+              <a:t>2/9/17</a:t>
             </a:fld>
             <a:endParaRPr lang="en-US"/>
           </a:p>
@@ -690,7 +691,7 @@
           <a:p>
             <a:fld id="{F86DE704-5A85-4041-9FC6-7273780BCBF6}" type="datetimeFigureOut">
               <a:rPr lang="en-US" smtClean="0"/>
-              <a:t>9/30/16</a:t>
+              <a:t>2/9/17</a:t>
             </a:fld>
             <a:endParaRPr lang="en-US"/>
           </a:p>
@@ -860,7 +861,7 @@
           <a:p>
             <a:fld id="{F86DE704-5A85-4041-9FC6-7273780BCBF6}" type="datetimeFigureOut">
               <a:rPr lang="en-US" smtClean="0"/>
-              <a:t>9/30/16</a:t>
+              <a:t>2/9/17</a:t>
             </a:fld>
             <a:endParaRPr lang="en-US"/>
           </a:p>
@@ -1040,7 +1041,7 @@
           <a:p>
             <a:fld id="{F86DE704-5A85-4041-9FC6-7273780BCBF6}" type="datetimeFigureOut">
               <a:rPr lang="en-US" smtClean="0"/>
-              <a:t>9/30/16</a:t>
+              <a:t>2/9/17</a:t>
             </a:fld>
             <a:endParaRPr lang="en-US"/>
           </a:p>
@@ -1210,7 +1211,7 @@
           <a:p>
             <a:fld id="{F86DE704-5A85-4041-9FC6-7273780BCBF6}" type="datetimeFigureOut">
               <a:rPr lang="en-US" smtClean="0"/>
-              <a:t>9/30/16</a:t>
+              <a:t>2/9/17</a:t>
             </a:fld>
             <a:endParaRPr lang="en-US"/>
           </a:p>
@@ -1456,7 +1457,7 @@
           <a:p>
             <a:fld id="{F86DE704-5A85-4041-9FC6-7273780BCBF6}" type="datetimeFigureOut">
               <a:rPr lang="en-US" smtClean="0"/>
-              <a:t>9/30/16</a:t>
+              <a:t>2/9/17</a:t>
             </a:fld>
             <a:endParaRPr lang="en-US"/>
           </a:p>
@@ -1688,7 +1689,7 @@
           <a:p>
             <a:fld id="{F86DE704-5A85-4041-9FC6-7273780BCBF6}" type="datetimeFigureOut">
               <a:rPr lang="en-US" smtClean="0"/>
-              <a:t>9/30/16</a:t>
+              <a:t>2/9/17</a:t>
             </a:fld>
             <a:endParaRPr lang="en-US"/>
           </a:p>
@@ -2055,7 +2056,7 @@
           <a:p>
             <a:fld id="{F86DE704-5A85-4041-9FC6-7273780BCBF6}" type="datetimeFigureOut">
               <a:rPr lang="en-US" smtClean="0"/>
-              <a:t>9/30/16</a:t>
+              <a:t>2/9/17</a:t>
             </a:fld>
             <a:endParaRPr lang="en-US"/>
           </a:p>
@@ -2173,7 +2174,7 @@
           <a:p>
             <a:fld id="{F86DE704-5A85-4041-9FC6-7273780BCBF6}" type="datetimeFigureOut">
               <a:rPr lang="en-US" smtClean="0"/>
-              <a:t>9/30/16</a:t>
+              <a:t>2/9/17</a:t>
             </a:fld>
             <a:endParaRPr lang="en-US"/>
           </a:p>
@@ -2268,7 +2269,7 @@
           <a:p>
             <a:fld id="{F86DE704-5A85-4041-9FC6-7273780BCBF6}" type="datetimeFigureOut">
               <a:rPr lang="en-US" smtClean="0"/>
-              <a:t>9/30/16</a:t>
+              <a:t>2/9/17</a:t>
             </a:fld>
             <a:endParaRPr lang="en-US"/>
           </a:p>
@@ -2545,7 +2546,7 @@
           <a:p>
             <a:fld id="{F86DE704-5A85-4041-9FC6-7273780BCBF6}" type="datetimeFigureOut">
               <a:rPr lang="en-US" smtClean="0"/>
-              <a:t>9/30/16</a:t>
+              <a:t>2/9/17</a:t>
             </a:fld>
             <a:endParaRPr lang="en-US"/>
           </a:p>
@@ -2798,7 +2799,7 @@
           <a:p>
             <a:fld id="{F86DE704-5A85-4041-9FC6-7273780BCBF6}" type="datetimeFigureOut">
               <a:rPr lang="en-US" smtClean="0"/>
-              <a:t>9/30/16</a:t>
+              <a:t>2/9/17</a:t>
             </a:fld>
             <a:endParaRPr lang="en-US"/>
           </a:p>
@@ -3011,7 +3012,7 @@
           <a:p>
             <a:fld id="{F86DE704-5A85-4041-9FC6-7273780BCBF6}" type="datetimeFigureOut">
               <a:rPr lang="en-US" smtClean="0"/>
-              <a:t>9/30/16</a:t>
+              <a:t>2/9/17</a:t>
             </a:fld>
             <a:endParaRPr lang="en-US"/>
           </a:p>
@@ -3501,11 +3502,7 @@
             <a:pPr algn="ctr"/>
             <a:r>
               <a:rPr lang="en-US" sz="2800" dirty="0" smtClean="0"/>
-              <a:t>Lesson </a:t>
-            </a:r>
-            <a:r>
-              <a:rPr lang="en-US" sz="2800" dirty="0" smtClean="0"/>
-              <a:t>3: Getting Classy</a:t>
+              <a:t>Lesson 3: Getting Classy</a:t>
             </a:r>
             <a:endParaRPr lang="en-US" sz="2800" dirty="0"/>
           </a:p>
@@ -3603,7 +3600,7 @@
             <a:pPr algn="ctr"/>
             <a:r>
               <a:rPr lang="en-US" dirty="0" smtClean="0"/>
-              <a:t>Getting your inheritance</a:t>
+              <a:t>Being more specific</a:t>
             </a:r>
             <a:endParaRPr lang="en-US" dirty="0"/>
           </a:p>
@@ -3611,7 +3608,7 @@
       </p:sp>
       <p:pic>
         <p:nvPicPr>
-          <p:cNvPr id="4" name="Content Placeholder 3"/>
+          <p:cNvPr id="9" name="Content Placeholder 8"/>
           <p:cNvPicPr>
             <a:picLocks noGrp="1" noChangeAspect="1"/>
           </p:cNvPicPr>
@@ -3633,14 +3630,14 @@
         </p:blipFill>
         <p:spPr>
           <a:xfrm>
-            <a:off x="2146300" y="1690688"/>
-            <a:ext cx="7899400" cy="3492500"/>
+            <a:off x="838200" y="2186705"/>
+            <a:ext cx="10515600" cy="3629178"/>
           </a:xfrm>
         </p:spPr>
       </p:pic>
       <p:pic>
         <p:nvPicPr>
-          <p:cNvPr id="5" name="Picture 4"/>
+          <p:cNvPr id="4" name="Picture 3"/>
           <p:cNvPicPr>
             <a:picLocks noChangeAspect="1"/>
           </p:cNvPicPr>
@@ -3671,7 +3668,7 @@
     </p:spTree>
     <p:extLst>
       <p:ext uri="{BB962C8B-B14F-4D97-AF65-F5344CB8AC3E}">
-        <p14:creationId xmlns:p14="http://schemas.microsoft.com/office/powerpoint/2010/main" val="1246628577"/>
+        <p14:creationId xmlns:p14="http://schemas.microsoft.com/office/powerpoint/2010/main" val="368235577"/>
       </p:ext>
     </p:extLst>
   </p:cSld>
@@ -3716,6 +3713,119 @@
             <a:pPr algn="ctr"/>
             <a:r>
               <a:rPr lang="en-US" dirty="0" smtClean="0"/>
+              <a:t>Getting your inheritance</a:t>
+            </a:r>
+            <a:endParaRPr lang="en-US" dirty="0"/>
+          </a:p>
+        </p:txBody>
+      </p:sp>
+      <p:pic>
+        <p:nvPicPr>
+          <p:cNvPr id="4" name="Content Placeholder 3"/>
+          <p:cNvPicPr>
+            <a:picLocks noGrp="1" noChangeAspect="1"/>
+          </p:cNvPicPr>
+          <p:nvPr>
+            <p:ph idx="1"/>
+          </p:nvPr>
+        </p:nvPicPr>
+        <p:blipFill>
+          <a:blip r:embed="rId2">
+            <a:extLst>
+              <a:ext uri="{28A0092B-C50C-407E-A947-70E740481C1C}">
+                <a14:useLocalDpi xmlns:a14="http://schemas.microsoft.com/office/drawing/2010/main" val="0"/>
+              </a:ext>
+            </a:extLst>
+          </a:blip>
+          <a:stretch>
+            <a:fillRect/>
+          </a:stretch>
+        </p:blipFill>
+        <p:spPr>
+          <a:xfrm>
+            <a:off x="2146300" y="1690688"/>
+            <a:ext cx="7899400" cy="3492500"/>
+          </a:xfrm>
+        </p:spPr>
+      </p:pic>
+      <p:pic>
+        <p:nvPicPr>
+          <p:cNvPr id="5" name="Picture 4"/>
+          <p:cNvPicPr>
+            <a:picLocks noChangeAspect="1"/>
+          </p:cNvPicPr>
+          <p:nvPr/>
+        </p:nvPicPr>
+        <p:blipFill>
+          <a:blip r:embed="rId3">
+            <a:extLst>
+              <a:ext uri="{28A0092B-C50C-407E-A947-70E740481C1C}">
+                <a14:useLocalDpi xmlns:a14="http://schemas.microsoft.com/office/drawing/2010/main" val="0"/>
+              </a:ext>
+            </a:extLst>
+          </a:blip>
+          <a:stretch>
+            <a:fillRect/>
+          </a:stretch>
+        </p:blipFill>
+        <p:spPr>
+          <a:xfrm>
+            <a:off x="9801412" y="4624575"/>
+            <a:ext cx="1552388" cy="1552388"/>
+          </a:xfrm>
+          <a:prstGeom prst="rect">
+            <a:avLst/>
+          </a:prstGeom>
+        </p:spPr>
+      </p:pic>
+    </p:spTree>
+    <p:extLst>
+      <p:ext uri="{BB962C8B-B14F-4D97-AF65-F5344CB8AC3E}">
+        <p14:creationId xmlns:p14="http://schemas.microsoft.com/office/powerpoint/2010/main" val="1246628577"/>
+      </p:ext>
+    </p:extLst>
+  </p:cSld>
+  <p:clrMapOvr>
+    <a:masterClrMapping/>
+  </p:clrMapOvr>
+</p:sld>
+</file>
+
+<file path=ppt/slides/slide12.xml><?xml version="1.0" encoding="utf-8"?>
+<p:sld xmlns:a="http://schemas.openxmlformats.org/drawingml/2006/main" xmlns:r="http://schemas.openxmlformats.org/officeDocument/2006/relationships" xmlns:p="http://schemas.openxmlformats.org/presentationml/2006/main">
+  <p:cSld>
+    <p:spTree>
+      <p:nvGrpSpPr>
+        <p:cNvPr id="1" name=""/>
+        <p:cNvGrpSpPr/>
+        <p:nvPr/>
+      </p:nvGrpSpPr>
+      <p:grpSpPr>
+        <a:xfrm>
+          <a:off x="0" y="0"/>
+          <a:ext cx="0" cy="0"/>
+          <a:chOff x="0" y="0"/>
+          <a:chExt cx="0" cy="0"/>
+        </a:xfrm>
+      </p:grpSpPr>
+      <p:sp>
+        <p:nvSpPr>
+          <p:cNvPr id="2" name="Title 1"/>
+          <p:cNvSpPr>
+            <a:spLocks noGrp="1"/>
+          </p:cNvSpPr>
+          <p:nvPr>
+            <p:ph type="title"/>
+          </p:nvPr>
+        </p:nvSpPr>
+        <p:spPr/>
+        <p:txBody>
+          <a:bodyPr/>
+          <a:lstStyle/>
+          <a:p>
+            <a:pPr algn="ctr"/>
+            <a:r>
+              <a:rPr lang="en-US" dirty="0" smtClean="0"/>
               <a:t>Exercise/Homework</a:t>
             </a:r>
             <a:r>
@@ -3799,7 +3909,7 @@
             <a:pPr algn="ctr"/>
             <a:r>
               <a:rPr lang="en-US" dirty="0" smtClean="0"/>
-              <a:t>Questions? Comments? Come see us in S32, on Monday, 11:00 – 12:00</a:t>
+              <a:t>Questions? Comments? Come see us in S13, on Thursday, 11:00 – 12:00</a:t>
             </a:r>
             <a:endParaRPr lang="en-US" dirty="0"/>
           </a:p>
@@ -4419,6 +4529,133 @@
       </p:grpSpPr>
       <p:sp>
         <p:nvSpPr>
+          <p:cNvPr id="6" name="Rectangle 5"/>
+          <p:cNvSpPr/>
+          <p:nvPr/>
+        </p:nvSpPr>
+        <p:spPr>
+          <a:xfrm>
+            <a:off x="3048000" y="3105835"/>
+            <a:ext cx="6096000" cy="646331"/>
+          </a:xfrm>
+          <a:prstGeom prst="rect">
+            <a:avLst/>
+          </a:prstGeom>
+        </p:spPr>
+        <p:txBody>
+          <a:bodyPr>
+            <a:spAutoFit/>
+          </a:bodyPr>
+          <a:lstStyle/>
+          <a:p>
+            <a:r>
+              <a:rPr lang="en-US" dirty="0"/>
+              <a:t>http://s2.quickmeme.com/</a:t>
+            </a:r>
+            <a:r>
+              <a:rPr lang="en-US" dirty="0" err="1"/>
+              <a:t>img</a:t>
+            </a:r>
+            <a:r>
+              <a:rPr lang="en-US" dirty="0"/>
+              <a:t>/72/72ba90745628a5c27e7f844dacdafc9318cf7876b9de9f424cebf0018345e1cc.jpg</a:t>
+            </a:r>
+          </a:p>
+        </p:txBody>
+      </p:sp>
+      <p:pic>
+        <p:nvPicPr>
+          <p:cNvPr id="7" name="Picture 6"/>
+          <p:cNvPicPr>
+            <a:picLocks noChangeAspect="1"/>
+          </p:cNvPicPr>
+          <p:nvPr/>
+        </p:nvPicPr>
+        <p:blipFill>
+          <a:blip r:embed="rId2"/>
+          <a:stretch>
+            <a:fillRect/>
+          </a:stretch>
+        </p:blipFill>
+        <p:spPr>
+          <a:xfrm>
+            <a:off x="2127250" y="793750"/>
+            <a:ext cx="7937500" cy="5270500"/>
+          </a:xfrm>
+          <a:prstGeom prst="rect">
+            <a:avLst/>
+          </a:prstGeom>
+        </p:spPr>
+      </p:pic>
+      <p:pic>
+        <p:nvPicPr>
+          <p:cNvPr id="8" name="Picture 7"/>
+          <p:cNvPicPr>
+            <a:picLocks noChangeAspect="1"/>
+          </p:cNvPicPr>
+          <p:nvPr/>
+        </p:nvPicPr>
+        <p:blipFill>
+          <a:blip r:embed="rId3">
+            <a:extLst>
+              <a:ext uri="{28A0092B-C50C-407E-A947-70E740481C1C}">
+                <a14:useLocalDpi xmlns:a14="http://schemas.microsoft.com/office/drawing/2010/main" val="0"/>
+              </a:ext>
+            </a:extLst>
+          </a:blip>
+          <a:stretch>
+            <a:fillRect/>
+          </a:stretch>
+        </p:blipFill>
+        <p:spPr>
+          <a:xfrm>
+            <a:off x="9801412" y="4624575"/>
+            <a:ext cx="1552388" cy="1552388"/>
+          </a:xfrm>
+          <a:prstGeom prst="rect">
+            <a:avLst/>
+          </a:prstGeom>
+        </p:spPr>
+      </p:pic>
+    </p:spTree>
+    <p:extLst>
+      <p:ext uri="{BB962C8B-B14F-4D97-AF65-F5344CB8AC3E}">
+        <p14:creationId xmlns:p14="http://schemas.microsoft.com/office/powerpoint/2010/main" val="261465460"/>
+      </p:ext>
+    </p:extLst>
+  </p:cSld>
+  <p:clrMapOvr>
+    <a:masterClrMapping/>
+  </p:clrMapOvr>
+  <p:timing>
+    <p:tnLst>
+      <p:par>
+        <p:cTn id="1" dur="indefinite" restart="never" nodeType="tmRoot"/>
+      </p:par>
+    </p:tnLst>
+  </p:timing>
+</p:sld>
+</file>
+
+<file path=ppt/slides/slide7.xml><?xml version="1.0" encoding="utf-8"?>
+<p:sld xmlns:a="http://schemas.openxmlformats.org/drawingml/2006/main" xmlns:r="http://schemas.openxmlformats.org/officeDocument/2006/relationships" xmlns:p="http://schemas.openxmlformats.org/presentationml/2006/main">
+  <p:cSld>
+    <p:spTree>
+      <p:nvGrpSpPr>
+        <p:cNvPr id="1" name=""/>
+        <p:cNvGrpSpPr/>
+        <p:nvPr/>
+      </p:nvGrpSpPr>
+      <p:grpSpPr>
+        <a:xfrm>
+          <a:off x="0" y="0"/>
+          <a:ext cx="0" cy="0"/>
+          <a:chOff x="0" y="0"/>
+          <a:chExt cx="0" cy="0"/>
+        </a:xfrm>
+      </p:grpSpPr>
+      <p:sp>
+        <p:nvSpPr>
           <p:cNvPr id="2" name="Title 1"/>
           <p:cNvSpPr>
             <a:spLocks noGrp="1"/>
@@ -4500,209 +4737,57 @@
           </a:prstGeom>
         </p:spPr>
       </p:pic>
+      <p:sp>
+        <p:nvSpPr>
+          <p:cNvPr id="6" name="TextBox 5"/>
+          <p:cNvSpPr txBox="1"/>
+          <p:nvPr/>
+        </p:nvSpPr>
+        <p:spPr>
+          <a:xfrm>
+            <a:off x="838200" y="5400030"/>
+            <a:ext cx="7483331" cy="646331"/>
+          </a:xfrm>
+          <a:prstGeom prst="rect">
+            <a:avLst/>
+          </a:prstGeom>
+          <a:noFill/>
+        </p:spPr>
+        <p:txBody>
+          <a:bodyPr wrap="none" rtlCol="0">
+            <a:spAutoFit/>
+          </a:bodyPr>
+          <a:lstStyle/>
+          <a:p>
+            <a:r>
+              <a:rPr lang="en-US" dirty="0" smtClean="0"/>
+              <a:t>When we start a class, much like a program, we might want to do a few things</a:t>
+            </a:r>
+          </a:p>
+          <a:p>
+            <a:r>
+              <a:rPr lang="en-US" dirty="0" smtClean="0"/>
+              <a:t>What do you think is the meaning of </a:t>
+            </a:r>
+            <a:r>
+              <a:rPr lang="en-US" b="1" dirty="0" smtClean="0">
+                <a:latin typeface="Consolas" charset="0"/>
+                <a:ea typeface="Consolas" charset="0"/>
+                <a:cs typeface="Consolas" charset="0"/>
+              </a:rPr>
+              <a:t>self</a:t>
+            </a:r>
+            <a:r>
+              <a:rPr lang="en-US" dirty="0" smtClean="0"/>
+              <a:t> ?</a:t>
+            </a:r>
+          </a:p>
+        </p:txBody>
+      </p:sp>
     </p:spTree>
     <p:extLst>
       <p:ext uri="{BB962C8B-B14F-4D97-AF65-F5344CB8AC3E}">
         <p14:creationId xmlns:p14="http://schemas.microsoft.com/office/powerpoint/2010/main" val="880129659"/>
-      </p:ext>
-    </p:extLst>
-  </p:cSld>
-  <p:clrMapOvr>
-    <a:masterClrMapping/>
-  </p:clrMapOvr>
-</p:sld>
-</file>
-
-<file path=ppt/slides/slide7.xml><?xml version="1.0" encoding="utf-8"?>
-<p:sld xmlns:a="http://schemas.openxmlformats.org/drawingml/2006/main" xmlns:r="http://schemas.openxmlformats.org/officeDocument/2006/relationships" xmlns:p="http://schemas.openxmlformats.org/presentationml/2006/main">
-  <p:cSld>
-    <p:spTree>
-      <p:nvGrpSpPr>
-        <p:cNvPr id="1" name=""/>
-        <p:cNvGrpSpPr/>
-        <p:nvPr/>
-      </p:nvGrpSpPr>
-      <p:grpSpPr>
-        <a:xfrm>
-          <a:off x="0" y="0"/>
-          <a:ext cx="0" cy="0"/>
-          <a:chOff x="0" y="0"/>
-          <a:chExt cx="0" cy="0"/>
-        </a:xfrm>
-      </p:grpSpPr>
-      <p:sp>
-        <p:nvSpPr>
-          <p:cNvPr id="2" name="Title 1"/>
-          <p:cNvSpPr>
-            <a:spLocks noGrp="1"/>
-          </p:cNvSpPr>
-          <p:nvPr>
-            <p:ph type="title"/>
-          </p:nvPr>
-        </p:nvSpPr>
-        <p:spPr/>
-        <p:txBody>
-          <a:bodyPr/>
-          <a:lstStyle/>
-          <a:p>
-            <a:pPr algn="ctr"/>
-            <a:r>
-              <a:rPr lang="en-US" dirty="0" smtClean="0"/>
-              <a:t>How do we invoke it?</a:t>
-            </a:r>
-            <a:endParaRPr lang="en-US" dirty="0"/>
-          </a:p>
-        </p:txBody>
-      </p:sp>
-      <p:pic>
-        <p:nvPicPr>
-          <p:cNvPr id="4" name="Content Placeholder 3"/>
-          <p:cNvPicPr>
-            <a:picLocks noGrp="1" noChangeAspect="1"/>
-          </p:cNvPicPr>
-          <p:nvPr>
-            <p:ph idx="1"/>
-          </p:nvPr>
-        </p:nvPicPr>
-        <p:blipFill>
-          <a:blip r:embed="rId2">
-            <a:extLst>
-              <a:ext uri="{28A0092B-C50C-407E-A947-70E740481C1C}">
-                <a14:useLocalDpi xmlns:a14="http://schemas.microsoft.com/office/drawing/2010/main" val="0"/>
-              </a:ext>
-            </a:extLst>
-          </a:blip>
-          <a:stretch>
-            <a:fillRect/>
-          </a:stretch>
-        </p:blipFill>
-        <p:spPr>
-          <a:xfrm>
-            <a:off x="2559050" y="1690688"/>
-            <a:ext cx="7073900" cy="800100"/>
-          </a:xfrm>
-        </p:spPr>
-      </p:pic>
-      <p:pic>
-        <p:nvPicPr>
-          <p:cNvPr id="5" name="Picture 4"/>
-          <p:cNvPicPr>
-            <a:picLocks noChangeAspect="1"/>
-          </p:cNvPicPr>
-          <p:nvPr/>
-        </p:nvPicPr>
-        <p:blipFill>
-          <a:blip r:embed="rId3">
-            <a:extLst>
-              <a:ext uri="{28A0092B-C50C-407E-A947-70E740481C1C}">
-                <a14:useLocalDpi xmlns:a14="http://schemas.microsoft.com/office/drawing/2010/main" val="0"/>
-              </a:ext>
-            </a:extLst>
-          </a:blip>
-          <a:stretch>
-            <a:fillRect/>
-          </a:stretch>
-        </p:blipFill>
-        <p:spPr>
-          <a:xfrm>
-            <a:off x="9801412" y="4624575"/>
-            <a:ext cx="1552388" cy="1552388"/>
-          </a:xfrm>
-          <a:prstGeom prst="rect">
-            <a:avLst/>
-          </a:prstGeom>
-        </p:spPr>
-      </p:pic>
-      <p:sp>
-        <p:nvSpPr>
-          <p:cNvPr id="7" name="TextBox 6"/>
-          <p:cNvSpPr txBox="1"/>
-          <p:nvPr/>
-        </p:nvSpPr>
-        <p:spPr>
-          <a:xfrm>
-            <a:off x="4798786" y="3062549"/>
-            <a:ext cx="2427716" cy="461665"/>
-          </a:xfrm>
-          <a:prstGeom prst="rect">
-            <a:avLst/>
-          </a:prstGeom>
-          <a:noFill/>
-        </p:spPr>
-        <p:txBody>
-          <a:bodyPr wrap="none" rtlCol="0">
-            <a:spAutoFit/>
-          </a:bodyPr>
-          <a:lstStyle/>
-          <a:p>
-            <a:r>
-              <a:rPr lang="en-US" sz="2400" dirty="0" smtClean="0"/>
-              <a:t>What will this do?</a:t>
-            </a:r>
-            <a:endParaRPr lang="en-US" sz="2400" dirty="0"/>
-          </a:p>
-        </p:txBody>
-      </p:sp>
-      <p:sp>
-        <p:nvSpPr>
-          <p:cNvPr id="8" name="TextBox 7"/>
-          <p:cNvSpPr txBox="1"/>
-          <p:nvPr/>
-        </p:nvSpPr>
-        <p:spPr>
-          <a:xfrm>
-            <a:off x="3889094" y="4155311"/>
-            <a:ext cx="184731" cy="369332"/>
-          </a:xfrm>
-          <a:prstGeom prst="rect">
-            <a:avLst/>
-          </a:prstGeom>
-          <a:noFill/>
-        </p:spPr>
-        <p:txBody>
-          <a:bodyPr wrap="none" rtlCol="0">
-            <a:spAutoFit/>
-          </a:bodyPr>
-          <a:lstStyle/>
-          <a:p>
-            <a:endParaRPr lang="en-US" dirty="0"/>
-          </a:p>
-        </p:txBody>
-      </p:sp>
-      <p:pic>
-        <p:nvPicPr>
-          <p:cNvPr id="3" name="Picture 2"/>
-          <p:cNvPicPr>
-            <a:picLocks noChangeAspect="1"/>
-          </p:cNvPicPr>
-          <p:nvPr/>
-        </p:nvPicPr>
-        <p:blipFill>
-          <a:blip r:embed="rId4">
-            <a:extLst>
-              <a:ext uri="{28A0092B-C50C-407E-A947-70E740481C1C}">
-                <a14:useLocalDpi xmlns:a14="http://schemas.microsoft.com/office/drawing/2010/main" val="0"/>
-              </a:ext>
-            </a:extLst>
-          </a:blip>
-          <a:stretch>
-            <a:fillRect/>
-          </a:stretch>
-        </p:blipFill>
-        <p:spPr>
-          <a:xfrm>
-            <a:off x="4540250" y="4059425"/>
-            <a:ext cx="3111500" cy="1130300"/>
-          </a:xfrm>
-          <a:prstGeom prst="rect">
-            <a:avLst/>
-          </a:prstGeom>
-        </p:spPr>
-      </p:pic>
-    </p:spTree>
-    <p:extLst>
-      <p:ext uri="{BB962C8B-B14F-4D97-AF65-F5344CB8AC3E}">
-        <p14:creationId xmlns:p14="http://schemas.microsoft.com/office/powerpoint/2010/main" val="348759232"/>
       </p:ext>
     </p:extLst>
   </p:cSld>
@@ -4747,77 +4832,7 @@
             <a:pPr algn="ctr"/>
             <a:r>
               <a:rPr lang="en-US" dirty="0" smtClean="0"/>
-              <a:t>What happened?</a:t>
-            </a:r>
-            <a:endParaRPr lang="en-US" dirty="0"/>
-          </a:p>
-        </p:txBody>
-      </p:sp>
-      <p:sp>
-        <p:nvSpPr>
-          <p:cNvPr id="3" name="Content Placeholder 2"/>
-          <p:cNvSpPr>
-            <a:spLocks noGrp="1"/>
-          </p:cNvSpPr>
-          <p:nvPr>
-            <p:ph idx="1"/>
-          </p:nvPr>
-        </p:nvSpPr>
-        <p:spPr/>
-        <p:txBody>
-          <a:bodyPr/>
-          <a:lstStyle/>
-          <a:p>
-            <a:r>
-              <a:rPr lang="en-US" dirty="0" smtClean="0"/>
-              <a:t>When you print, Python tries to render the output as a string</a:t>
-            </a:r>
-          </a:p>
-          <a:p>
-            <a:r>
-              <a:rPr lang="en-US" dirty="0" smtClean="0"/>
-              <a:t>Python doesn’t know how to turn a </a:t>
-            </a:r>
-            <a:r>
-              <a:rPr lang="en-US" dirty="0" smtClean="0">
-                <a:latin typeface="Consolas" charset="0"/>
-                <a:ea typeface="Consolas" charset="0"/>
-                <a:cs typeface="Consolas" charset="0"/>
-              </a:rPr>
-              <a:t>Restaurant</a:t>
-            </a:r>
-            <a:r>
-              <a:rPr lang="en-US" dirty="0" smtClean="0"/>
-              <a:t> object into a string</a:t>
-            </a:r>
-          </a:p>
-          <a:p>
-            <a:r>
-              <a:rPr lang="en-US" dirty="0" smtClean="0"/>
-              <a:t>Another member method for the Restaurant class:</a:t>
-            </a:r>
-          </a:p>
-          <a:p>
-            <a:endParaRPr lang="en-US" dirty="0"/>
-          </a:p>
-          <a:p>
-            <a:endParaRPr lang="en-US" dirty="0" smtClean="0"/>
-          </a:p>
-          <a:p>
-            <a:endParaRPr lang="en-US" dirty="0"/>
-          </a:p>
-          <a:p>
-            <a:r>
-              <a:rPr lang="en-US" dirty="0" smtClean="0"/>
-              <a:t>Does print </a:t>
-            </a:r>
-            <a:r>
-              <a:rPr lang="en-US" dirty="0" err="1" smtClean="0"/>
-              <a:t>moro</a:t>
-            </a:r>
-            <a:r>
-              <a:rPr lang="en-US" dirty="0" smtClean="0"/>
-              <a:t>         work now?</a:t>
+              <a:t>Let’s Get Classy</a:t>
             </a:r>
             <a:endParaRPr lang="en-US" dirty="0"/>
           </a:p>
@@ -4825,11 +4840,13 @@
       </p:sp>
       <p:pic>
         <p:nvPicPr>
-          <p:cNvPr id="4" name="Picture 3"/>
+          <p:cNvPr id="4" name="Content Placeholder 3"/>
           <p:cNvPicPr>
-            <a:picLocks noChangeAspect="1"/>
+            <a:picLocks noGrp="1" noChangeAspect="1"/>
           </p:cNvPicPr>
-          <p:nvPr/>
+          <p:nvPr>
+            <p:ph idx="1"/>
+          </p:nvPr>
         </p:nvPicPr>
         <p:blipFill>
           <a:blip r:embed="rId2">
@@ -4845,12 +4862,9 @@
         </p:blipFill>
         <p:spPr>
           <a:xfrm>
-            <a:off x="9801412" y="4624575"/>
-            <a:ext cx="1552388" cy="1552388"/>
-          </a:xfrm>
-          <a:prstGeom prst="rect">
-            <a:avLst/>
-          </a:prstGeom>
+            <a:off x="2559050" y="1690688"/>
+            <a:ext cx="7073900" cy="800100"/>
+          </a:xfrm>
         </p:spPr>
       </p:pic>
       <p:pic>
@@ -4875,17 +4889,73 @@
         </p:blipFill>
         <p:spPr>
           <a:xfrm>
-            <a:off x="838200" y="3482669"/>
-            <a:ext cx="10568232" cy="1141906"/>
+            <a:off x="9801412" y="4624575"/>
+            <a:ext cx="1552388" cy="1552388"/>
           </a:xfrm>
           <a:prstGeom prst="rect">
             <a:avLst/>
           </a:prstGeom>
         </p:spPr>
       </p:pic>
+      <p:sp>
+        <p:nvSpPr>
+          <p:cNvPr id="7" name="TextBox 6"/>
+          <p:cNvSpPr txBox="1"/>
+          <p:nvPr/>
+        </p:nvSpPr>
+        <p:spPr>
+          <a:xfrm>
+            <a:off x="4798786" y="3062549"/>
+            <a:ext cx="2427716" cy="461665"/>
+          </a:xfrm>
+          <a:prstGeom prst="rect">
+            <a:avLst/>
+          </a:prstGeom>
+          <a:noFill/>
+        </p:spPr>
+        <p:txBody>
+          <a:bodyPr wrap="none" rtlCol="0">
+            <a:spAutoFit/>
+          </a:bodyPr>
+          <a:lstStyle/>
+          <a:p>
+            <a:r>
+              <a:rPr lang="en-US" sz="2400" dirty="0" smtClean="0"/>
+              <a:t>What will this do?</a:t>
+            </a:r>
+            <a:endParaRPr lang="en-US" sz="2400" dirty="0"/>
+          </a:p>
+        </p:txBody>
+      </p:sp>
+      <p:sp>
+        <p:nvSpPr>
+          <p:cNvPr id="8" name="TextBox 7"/>
+          <p:cNvSpPr txBox="1"/>
+          <p:nvPr/>
+        </p:nvSpPr>
+        <p:spPr>
+          <a:xfrm>
+            <a:off x="3889094" y="4155311"/>
+            <a:ext cx="184731" cy="369332"/>
+          </a:xfrm>
+          <a:prstGeom prst="rect">
+            <a:avLst/>
+          </a:prstGeom>
+          <a:noFill/>
+        </p:spPr>
+        <p:txBody>
+          <a:bodyPr wrap="none" rtlCol="0">
+            <a:spAutoFit/>
+          </a:bodyPr>
+          <a:lstStyle/>
+          <a:p>
+            <a:endParaRPr lang="en-US" dirty="0"/>
+          </a:p>
+        </p:txBody>
+      </p:sp>
       <p:pic>
         <p:nvPicPr>
-          <p:cNvPr id="6" name="Picture 5"/>
+          <p:cNvPr id="3" name="Picture 2"/>
           <p:cNvPicPr>
             <a:picLocks noChangeAspect="1"/>
           </p:cNvPicPr>
@@ -4905,8 +4975,8 @@
         </p:blipFill>
         <p:spPr>
           <a:xfrm>
-            <a:off x="1966910" y="4781772"/>
-            <a:ext cx="2235264" cy="618997"/>
+            <a:off x="4540250" y="4059425"/>
+            <a:ext cx="3111500" cy="1130300"/>
           </a:xfrm>
           <a:prstGeom prst="rect">
             <a:avLst/>
@@ -4916,7 +4986,7 @@
     </p:spTree>
     <p:extLst>
       <p:ext uri="{BB962C8B-B14F-4D97-AF65-F5344CB8AC3E}">
-        <p14:creationId xmlns:p14="http://schemas.microsoft.com/office/powerpoint/2010/main" val="1424060165"/>
+        <p14:creationId xmlns:p14="http://schemas.microsoft.com/office/powerpoint/2010/main" val="348759232"/>
       </p:ext>
     </p:extLst>
   </p:cSld>
@@ -4961,7 +5031,77 @@
             <a:pPr algn="ctr"/>
             <a:r>
               <a:rPr lang="en-US" dirty="0" smtClean="0"/>
-              <a:t>Being more specific</a:t>
+              <a:t>What happened?</a:t>
+            </a:r>
+            <a:endParaRPr lang="en-US" dirty="0"/>
+          </a:p>
+        </p:txBody>
+      </p:sp>
+      <p:sp>
+        <p:nvSpPr>
+          <p:cNvPr id="3" name="Content Placeholder 2"/>
+          <p:cNvSpPr>
+            <a:spLocks noGrp="1"/>
+          </p:cNvSpPr>
+          <p:nvPr>
+            <p:ph idx="1"/>
+          </p:nvPr>
+        </p:nvSpPr>
+        <p:spPr/>
+        <p:txBody>
+          <a:bodyPr/>
+          <a:lstStyle/>
+          <a:p>
+            <a:r>
+              <a:rPr lang="en-US" dirty="0" smtClean="0"/>
+              <a:t>When you print, Python tries to render the output as a string</a:t>
+            </a:r>
+          </a:p>
+          <a:p>
+            <a:r>
+              <a:rPr lang="en-US" dirty="0" smtClean="0"/>
+              <a:t>Python doesn’t know how to turn a </a:t>
+            </a:r>
+            <a:r>
+              <a:rPr lang="en-US" dirty="0" smtClean="0">
+                <a:latin typeface="Consolas" charset="0"/>
+                <a:ea typeface="Consolas" charset="0"/>
+                <a:cs typeface="Consolas" charset="0"/>
+              </a:rPr>
+              <a:t>Restaurant</a:t>
+            </a:r>
+            <a:r>
+              <a:rPr lang="en-US" dirty="0" smtClean="0"/>
+              <a:t> object into a string</a:t>
+            </a:r>
+          </a:p>
+          <a:p>
+            <a:r>
+              <a:rPr lang="en-US" dirty="0" smtClean="0"/>
+              <a:t>Another member method for the Restaurant class:</a:t>
+            </a:r>
+          </a:p>
+          <a:p>
+            <a:endParaRPr lang="en-US" dirty="0"/>
+          </a:p>
+          <a:p>
+            <a:endParaRPr lang="en-US" dirty="0" smtClean="0"/>
+          </a:p>
+          <a:p>
+            <a:endParaRPr lang="en-US" dirty="0"/>
+          </a:p>
+          <a:p>
+            <a:r>
+              <a:rPr lang="en-US" dirty="0" smtClean="0"/>
+              <a:t>Does print </a:t>
+            </a:r>
+            <a:r>
+              <a:rPr lang="en-US" dirty="0" err="1" smtClean="0"/>
+              <a:t>moro</a:t>
+            </a:r>
+            <a:r>
+              <a:rPr lang="en-US" dirty="0" smtClean="0"/>
+              <a:t>         work now?</a:t>
             </a:r>
             <a:endParaRPr lang="en-US" dirty="0"/>
           </a:p>
@@ -4969,13 +5109,11 @@
       </p:sp>
       <p:pic>
         <p:nvPicPr>
-          <p:cNvPr id="9" name="Content Placeholder 8"/>
+          <p:cNvPr id="4" name="Picture 3"/>
           <p:cNvPicPr>
-            <a:picLocks noGrp="1" noChangeAspect="1"/>
+            <a:picLocks noChangeAspect="1"/>
           </p:cNvPicPr>
-          <p:nvPr>
-            <p:ph idx="1"/>
-          </p:nvPr>
+          <p:nvPr/>
         </p:nvPicPr>
         <p:blipFill>
           <a:blip r:embed="rId2">
@@ -4991,14 +5129,17 @@
         </p:blipFill>
         <p:spPr>
           <a:xfrm>
-            <a:off x="838200" y="2186705"/>
-            <a:ext cx="10515600" cy="3629178"/>
-          </a:xfrm>
+            <a:off x="9801412" y="4624575"/>
+            <a:ext cx="1552388" cy="1552388"/>
+          </a:xfrm>
+          <a:prstGeom prst="rect">
+            <a:avLst/>
+          </a:prstGeom>
         </p:spPr>
       </p:pic>
       <p:pic>
         <p:nvPicPr>
-          <p:cNvPr id="4" name="Picture 3"/>
+          <p:cNvPr id="5" name="Picture 4"/>
           <p:cNvPicPr>
             <a:picLocks noChangeAspect="1"/>
           </p:cNvPicPr>
@@ -5018,8 +5159,38 @@
         </p:blipFill>
         <p:spPr>
           <a:xfrm>
-            <a:off x="9801412" y="4624575"/>
-            <a:ext cx="1552388" cy="1552388"/>
+            <a:off x="838200" y="3482669"/>
+            <a:ext cx="10568232" cy="1141906"/>
+          </a:xfrm>
+          <a:prstGeom prst="rect">
+            <a:avLst/>
+          </a:prstGeom>
+        </p:spPr>
+      </p:pic>
+      <p:pic>
+        <p:nvPicPr>
+          <p:cNvPr id="6" name="Picture 5"/>
+          <p:cNvPicPr>
+            <a:picLocks noChangeAspect="1"/>
+          </p:cNvPicPr>
+          <p:nvPr/>
+        </p:nvPicPr>
+        <p:blipFill>
+          <a:blip r:embed="rId4">
+            <a:extLst>
+              <a:ext uri="{28A0092B-C50C-407E-A947-70E740481C1C}">
+                <a14:useLocalDpi xmlns:a14="http://schemas.microsoft.com/office/drawing/2010/main" val="0"/>
+              </a:ext>
+            </a:extLst>
+          </a:blip>
+          <a:stretch>
+            <a:fillRect/>
+          </a:stretch>
+        </p:blipFill>
+        <p:spPr>
+          <a:xfrm>
+            <a:off x="1966910" y="4781772"/>
+            <a:ext cx="2235264" cy="618997"/>
           </a:xfrm>
           <a:prstGeom prst="rect">
             <a:avLst/>
@@ -5029,7 +5200,7 @@
     </p:spTree>
     <p:extLst>
       <p:ext uri="{BB962C8B-B14F-4D97-AF65-F5344CB8AC3E}">
-        <p14:creationId xmlns:p14="http://schemas.microsoft.com/office/powerpoint/2010/main" val="368235577"/>
+        <p14:creationId xmlns:p14="http://schemas.microsoft.com/office/powerpoint/2010/main" val="1424060165"/>
       </p:ext>
     </p:extLst>
   </p:cSld>

</xml_diff>

<commit_message>
FInalising lesson 3 changes
</commit_message>
<xml_diff>
--- a/Python Level 2/Lesson 3/Session 3.pptx
+++ b/Python Level 2/Lesson 3/Session 3.pptx
@@ -208,7 +208,7 @@
           <a:p>
             <a:fld id="{A1609144-CA2D-5B42-9245-4141F5EB8897}" type="datetimeFigureOut">
               <a:rPr lang="en-US" smtClean="0"/>
-              <a:t>2/9/17</a:t>
+              <a:t>2/13/17</a:t>
             </a:fld>
             <a:endParaRPr lang="en-US"/>
           </a:p>
@@ -691,7 +691,7 @@
           <a:p>
             <a:fld id="{F86DE704-5A85-4041-9FC6-7273780BCBF6}" type="datetimeFigureOut">
               <a:rPr lang="en-US" smtClean="0"/>
-              <a:t>2/9/17</a:t>
+              <a:t>2/13/17</a:t>
             </a:fld>
             <a:endParaRPr lang="en-US"/>
           </a:p>
@@ -861,7 +861,7 @@
           <a:p>
             <a:fld id="{F86DE704-5A85-4041-9FC6-7273780BCBF6}" type="datetimeFigureOut">
               <a:rPr lang="en-US" smtClean="0"/>
-              <a:t>2/9/17</a:t>
+              <a:t>2/13/17</a:t>
             </a:fld>
             <a:endParaRPr lang="en-US"/>
           </a:p>
@@ -1041,7 +1041,7 @@
           <a:p>
             <a:fld id="{F86DE704-5A85-4041-9FC6-7273780BCBF6}" type="datetimeFigureOut">
               <a:rPr lang="en-US" smtClean="0"/>
-              <a:t>2/9/17</a:t>
+              <a:t>2/13/17</a:t>
             </a:fld>
             <a:endParaRPr lang="en-US"/>
           </a:p>
@@ -1211,7 +1211,7 @@
           <a:p>
             <a:fld id="{F86DE704-5A85-4041-9FC6-7273780BCBF6}" type="datetimeFigureOut">
               <a:rPr lang="en-US" smtClean="0"/>
-              <a:t>2/9/17</a:t>
+              <a:t>2/13/17</a:t>
             </a:fld>
             <a:endParaRPr lang="en-US"/>
           </a:p>
@@ -1457,7 +1457,7 @@
           <a:p>
             <a:fld id="{F86DE704-5A85-4041-9FC6-7273780BCBF6}" type="datetimeFigureOut">
               <a:rPr lang="en-US" smtClean="0"/>
-              <a:t>2/9/17</a:t>
+              <a:t>2/13/17</a:t>
             </a:fld>
             <a:endParaRPr lang="en-US"/>
           </a:p>
@@ -1689,7 +1689,7 @@
           <a:p>
             <a:fld id="{F86DE704-5A85-4041-9FC6-7273780BCBF6}" type="datetimeFigureOut">
               <a:rPr lang="en-US" smtClean="0"/>
-              <a:t>2/9/17</a:t>
+              <a:t>2/13/17</a:t>
             </a:fld>
             <a:endParaRPr lang="en-US"/>
           </a:p>
@@ -2056,7 +2056,7 @@
           <a:p>
             <a:fld id="{F86DE704-5A85-4041-9FC6-7273780BCBF6}" type="datetimeFigureOut">
               <a:rPr lang="en-US" smtClean="0"/>
-              <a:t>2/9/17</a:t>
+              <a:t>2/13/17</a:t>
             </a:fld>
             <a:endParaRPr lang="en-US"/>
           </a:p>
@@ -2174,7 +2174,7 @@
           <a:p>
             <a:fld id="{F86DE704-5A85-4041-9FC6-7273780BCBF6}" type="datetimeFigureOut">
               <a:rPr lang="en-US" smtClean="0"/>
-              <a:t>2/9/17</a:t>
+              <a:t>2/13/17</a:t>
             </a:fld>
             <a:endParaRPr lang="en-US"/>
           </a:p>
@@ -2269,7 +2269,7 @@
           <a:p>
             <a:fld id="{F86DE704-5A85-4041-9FC6-7273780BCBF6}" type="datetimeFigureOut">
               <a:rPr lang="en-US" smtClean="0"/>
-              <a:t>2/9/17</a:t>
+              <a:t>2/13/17</a:t>
             </a:fld>
             <a:endParaRPr lang="en-US"/>
           </a:p>
@@ -2546,7 +2546,7 @@
           <a:p>
             <a:fld id="{F86DE704-5A85-4041-9FC6-7273780BCBF6}" type="datetimeFigureOut">
               <a:rPr lang="en-US" smtClean="0"/>
-              <a:t>2/9/17</a:t>
+              <a:t>2/13/17</a:t>
             </a:fld>
             <a:endParaRPr lang="en-US"/>
           </a:p>
@@ -2799,7 +2799,7 @@
           <a:p>
             <a:fld id="{F86DE704-5A85-4041-9FC6-7273780BCBF6}" type="datetimeFigureOut">
               <a:rPr lang="en-US" smtClean="0"/>
-              <a:t>2/9/17</a:t>
+              <a:t>2/13/17</a:t>
             </a:fld>
             <a:endParaRPr lang="en-US"/>
           </a:p>
@@ -3012,7 +3012,7 @@
           <a:p>
             <a:fld id="{F86DE704-5A85-4041-9FC6-7273780BCBF6}" type="datetimeFigureOut">
               <a:rPr lang="en-US" smtClean="0"/>
-              <a:t>2/9/17</a:t>
+              <a:t>2/13/17</a:t>
             </a:fld>
             <a:endParaRPr lang="en-US"/>
           </a:p>
@@ -3826,7 +3826,7 @@
             <a:pPr algn="ctr"/>
             <a:r>
               <a:rPr lang="en-US" dirty="0" smtClean="0"/>
-              <a:t>Exercise/Homework</a:t>
+              <a:t>Exercise / Homework</a:t>
             </a:r>
             <a:r>
               <a:rPr lang="is-IS" dirty="0" smtClean="0"/>
@@ -3846,12 +3846,28 @@
             <p:ph idx="1"/>
           </p:nvPr>
         </p:nvSpPr>
-        <p:spPr/>
+        <p:spPr>
+          <a:xfrm>
+            <a:off x="838200" y="1558901"/>
+            <a:ext cx="10515600" cy="4351338"/>
+          </a:xfrm>
+        </p:spPr>
         <p:txBody>
           <a:bodyPr>
             <a:normAutofit/>
           </a:bodyPr>
           <a:lstStyle/>
+          <a:p>
+            <a:r>
+              <a:rPr lang="en-US" dirty="0" smtClean="0"/>
+              <a:t>Start with the followin</a:t>
+            </a:r>
+            <a:r>
+              <a:rPr lang="en-US" dirty="0"/>
+              <a:t>g code: http://go/0jhl1t2b</a:t>
+            </a:r>
+            <a:endParaRPr lang="en-US" dirty="0" smtClean="0"/>
+          </a:p>
           <a:p>
             <a:r>
               <a:rPr lang="en-US" dirty="0" smtClean="0"/>
@@ -3937,8 +3953,8 @@
         </p:blipFill>
         <p:spPr>
           <a:xfrm>
-            <a:off x="1075883" y="3278075"/>
-            <a:ext cx="8963212" cy="2423126"/>
+            <a:off x="1472215" y="3555906"/>
+            <a:ext cx="8329197" cy="2251725"/>
           </a:xfrm>
           <a:prstGeom prst="rect">
             <a:avLst/>
@@ -4745,8 +4761,8 @@
         </p:nvSpPr>
         <p:spPr>
           <a:xfrm>
-            <a:off x="838200" y="5400030"/>
-            <a:ext cx="7483331" cy="646331"/>
+            <a:off x="838200" y="5077603"/>
+            <a:ext cx="7483331" cy="1200329"/>
           </a:xfrm>
           <a:prstGeom prst="rect">
             <a:avLst/>
@@ -4779,8 +4795,22 @@
             </a:r>
             <a:r>
               <a:rPr lang="en-US" dirty="0" smtClean="0"/>
-              <a:t> ?</a:t>
-            </a:r>
+              <a:t> </a:t>
+            </a:r>
+            <a:r>
+              <a:rPr lang="en-US" dirty="0" smtClean="0"/>
+              <a:t>?</a:t>
+            </a:r>
+          </a:p>
+          <a:p>
+            <a:endParaRPr lang="en-US" dirty="0"/>
+          </a:p>
+          <a:p>
+            <a:r>
+              <a:rPr lang="en-US" dirty="0" smtClean="0"/>
+              <a:t>Put this class in a new file (for now) so we can experiment with it.</a:t>
+            </a:r>
+            <a:endParaRPr lang="en-US" dirty="0" smtClean="0"/>
           </a:p>
         </p:txBody>
       </p:sp>
@@ -4840,13 +4870,11 @@
       </p:sp>
       <p:pic>
         <p:nvPicPr>
-          <p:cNvPr id="4" name="Content Placeholder 3"/>
+          <p:cNvPr id="5" name="Picture 4"/>
           <p:cNvPicPr>
-            <a:picLocks noGrp="1" noChangeAspect="1"/>
+            <a:picLocks noChangeAspect="1"/>
           </p:cNvPicPr>
-          <p:nvPr>
-            <p:ph idx="1"/>
-          </p:nvPr>
+          <p:nvPr/>
         </p:nvPicPr>
         <p:blipFill>
           <a:blip r:embed="rId2">
@@ -4862,14 +4890,73 @@
         </p:blipFill>
         <p:spPr>
           <a:xfrm>
-            <a:off x="2559050" y="1690688"/>
-            <a:ext cx="7073900" cy="800100"/>
-          </a:xfrm>
+            <a:off x="9801412" y="4624575"/>
+            <a:ext cx="1552388" cy="1552388"/>
+          </a:xfrm>
+          <a:prstGeom prst="rect">
+            <a:avLst/>
+          </a:prstGeom>
         </p:spPr>
       </p:pic>
+      <p:sp>
+        <p:nvSpPr>
+          <p:cNvPr id="7" name="TextBox 6"/>
+          <p:cNvSpPr txBox="1"/>
+          <p:nvPr/>
+        </p:nvSpPr>
+        <p:spPr>
+          <a:xfrm>
+            <a:off x="4798786" y="3062549"/>
+            <a:ext cx="2427716" cy="461665"/>
+          </a:xfrm>
+          <a:prstGeom prst="rect">
+            <a:avLst/>
+          </a:prstGeom>
+          <a:noFill/>
+        </p:spPr>
+        <p:txBody>
+          <a:bodyPr wrap="none" rtlCol="0">
+            <a:spAutoFit/>
+          </a:bodyPr>
+          <a:lstStyle/>
+          <a:p>
+            <a:r>
+              <a:rPr lang="en-US" sz="2400" dirty="0" smtClean="0"/>
+              <a:t>What will this do?</a:t>
+            </a:r>
+            <a:endParaRPr lang="en-US" sz="2400" dirty="0"/>
+          </a:p>
+        </p:txBody>
+      </p:sp>
+      <p:sp>
+        <p:nvSpPr>
+          <p:cNvPr id="8" name="TextBox 7"/>
+          <p:cNvSpPr txBox="1"/>
+          <p:nvPr/>
+        </p:nvSpPr>
+        <p:spPr>
+          <a:xfrm>
+            <a:off x="3889094" y="4155311"/>
+            <a:ext cx="184731" cy="369332"/>
+          </a:xfrm>
+          <a:prstGeom prst="rect">
+            <a:avLst/>
+          </a:prstGeom>
+          <a:noFill/>
+        </p:spPr>
+        <p:txBody>
+          <a:bodyPr wrap="none" rtlCol="0">
+            <a:spAutoFit/>
+          </a:bodyPr>
+          <a:lstStyle/>
+          <a:p>
+            <a:endParaRPr lang="en-US" dirty="0"/>
+          </a:p>
+        </p:txBody>
+      </p:sp>
       <p:pic>
         <p:nvPicPr>
-          <p:cNvPr id="5" name="Picture 4"/>
+          <p:cNvPr id="3" name="Picture 2"/>
           <p:cNvPicPr>
             <a:picLocks noChangeAspect="1"/>
           </p:cNvPicPr>
@@ -4889,77 +4976,23 @@
         </p:blipFill>
         <p:spPr>
           <a:xfrm>
-            <a:off x="9801412" y="4624575"/>
-            <a:ext cx="1552388" cy="1552388"/>
+            <a:off x="4540250" y="3959493"/>
+            <a:ext cx="3111500" cy="1130300"/>
           </a:xfrm>
           <a:prstGeom prst="rect">
             <a:avLst/>
           </a:prstGeom>
         </p:spPr>
       </p:pic>
-      <p:sp>
-        <p:nvSpPr>
-          <p:cNvPr id="7" name="TextBox 6"/>
-          <p:cNvSpPr txBox="1"/>
-          <p:nvPr/>
-        </p:nvSpPr>
-        <p:spPr>
-          <a:xfrm>
-            <a:off x="4798786" y="3062549"/>
-            <a:ext cx="2427716" cy="461665"/>
-          </a:xfrm>
-          <a:prstGeom prst="rect">
-            <a:avLst/>
-          </a:prstGeom>
-          <a:noFill/>
-        </p:spPr>
-        <p:txBody>
-          <a:bodyPr wrap="none" rtlCol="0">
-            <a:spAutoFit/>
-          </a:bodyPr>
-          <a:lstStyle/>
-          <a:p>
-            <a:r>
-              <a:rPr lang="en-US" sz="2400" dirty="0" smtClean="0"/>
-              <a:t>What will this do?</a:t>
-            </a:r>
-            <a:endParaRPr lang="en-US" sz="2400" dirty="0"/>
-          </a:p>
-        </p:txBody>
-      </p:sp>
-      <p:sp>
-        <p:nvSpPr>
-          <p:cNvPr id="8" name="TextBox 7"/>
-          <p:cNvSpPr txBox="1"/>
-          <p:nvPr/>
-        </p:nvSpPr>
-        <p:spPr>
-          <a:xfrm>
-            <a:off x="3889094" y="4155311"/>
-            <a:ext cx="184731" cy="369332"/>
-          </a:xfrm>
-          <a:prstGeom prst="rect">
-            <a:avLst/>
-          </a:prstGeom>
-          <a:noFill/>
-        </p:spPr>
-        <p:txBody>
-          <a:bodyPr wrap="none" rtlCol="0">
-            <a:spAutoFit/>
-          </a:bodyPr>
-          <a:lstStyle/>
-          <a:p>
-            <a:endParaRPr lang="en-US" dirty="0"/>
-          </a:p>
-        </p:txBody>
-      </p:sp>
       <p:pic>
         <p:nvPicPr>
-          <p:cNvPr id="3" name="Picture 2"/>
+          <p:cNvPr id="12" name="Content Placeholder 11"/>
           <p:cNvPicPr>
-            <a:picLocks noChangeAspect="1"/>
+            <a:picLocks noGrp="1" noChangeAspect="1"/>
           </p:cNvPicPr>
-          <p:nvPr/>
+          <p:nvPr>
+            <p:ph idx="1"/>
+          </p:nvPr>
         </p:nvPicPr>
         <p:blipFill>
           <a:blip r:embed="rId4">
@@ -4975,12 +5008,9 @@
         </p:blipFill>
         <p:spPr>
           <a:xfrm>
-            <a:off x="4540250" y="4059425"/>
-            <a:ext cx="3111500" cy="1130300"/>
-          </a:xfrm>
-          <a:prstGeom prst="rect">
-            <a:avLst/>
-          </a:prstGeom>
+            <a:off x="754844" y="2174890"/>
+            <a:ext cx="10515600" cy="620053"/>
+          </a:xfrm>
         </p:spPr>
       </p:pic>
     </p:spTree>

</xml_diff>

<commit_message>
Python 3 examples changes
</commit_message>
<xml_diff>
--- a/Python Level 2/Lesson 3/Session 3.pptx
+++ b/Python Level 2/Lesson 3/Session 3.pptx
@@ -208,7 +208,7 @@
           <a:p>
             <a:fld id="{A1609144-CA2D-5B42-9245-4141F5EB8897}" type="datetimeFigureOut">
               <a:rPr lang="en-US" smtClean="0"/>
-              <a:t>6/6/18</a:t>
+              <a:t>10/9/18</a:t>
             </a:fld>
             <a:endParaRPr lang="en-US"/>
           </a:p>
@@ -688,7 +688,7 @@
           <a:p>
             <a:fld id="{F86DE704-5A85-4041-9FC6-7273780BCBF6}" type="datetimeFigureOut">
               <a:rPr lang="en-US" smtClean="0"/>
-              <a:t>6/6/18</a:t>
+              <a:t>10/9/18</a:t>
             </a:fld>
             <a:endParaRPr lang="en-US"/>
           </a:p>
@@ -856,7 +856,7 @@
           <a:p>
             <a:fld id="{F86DE704-5A85-4041-9FC6-7273780BCBF6}" type="datetimeFigureOut">
               <a:rPr lang="en-US" smtClean="0"/>
-              <a:t>6/6/18</a:t>
+              <a:t>10/9/18</a:t>
             </a:fld>
             <a:endParaRPr lang="en-US"/>
           </a:p>
@@ -1034,7 +1034,7 @@
           <a:p>
             <a:fld id="{F86DE704-5A85-4041-9FC6-7273780BCBF6}" type="datetimeFigureOut">
               <a:rPr lang="en-US" smtClean="0"/>
-              <a:t>6/6/18</a:t>
+              <a:t>10/9/18</a:t>
             </a:fld>
             <a:endParaRPr lang="en-US"/>
           </a:p>
@@ -1202,7 +1202,7 @@
           <a:p>
             <a:fld id="{F86DE704-5A85-4041-9FC6-7273780BCBF6}" type="datetimeFigureOut">
               <a:rPr lang="en-US" smtClean="0"/>
-              <a:t>6/6/18</a:t>
+              <a:t>10/9/18</a:t>
             </a:fld>
             <a:endParaRPr lang="en-US"/>
           </a:p>
@@ -1447,7 +1447,7 @@
           <a:p>
             <a:fld id="{F86DE704-5A85-4041-9FC6-7273780BCBF6}" type="datetimeFigureOut">
               <a:rPr lang="en-US" smtClean="0"/>
-              <a:t>6/6/18</a:t>
+              <a:t>10/9/18</a:t>
             </a:fld>
             <a:endParaRPr lang="en-US"/>
           </a:p>
@@ -1676,7 +1676,7 @@
           <a:p>
             <a:fld id="{F86DE704-5A85-4041-9FC6-7273780BCBF6}" type="datetimeFigureOut">
               <a:rPr lang="en-US" smtClean="0"/>
-              <a:t>6/6/18</a:t>
+              <a:t>10/9/18</a:t>
             </a:fld>
             <a:endParaRPr lang="en-US"/>
           </a:p>
@@ -2040,7 +2040,7 @@
           <a:p>
             <a:fld id="{F86DE704-5A85-4041-9FC6-7273780BCBF6}" type="datetimeFigureOut">
               <a:rPr lang="en-US" smtClean="0"/>
-              <a:t>6/6/18</a:t>
+              <a:t>10/9/18</a:t>
             </a:fld>
             <a:endParaRPr lang="en-US"/>
           </a:p>
@@ -2157,7 +2157,7 @@
           <a:p>
             <a:fld id="{F86DE704-5A85-4041-9FC6-7273780BCBF6}" type="datetimeFigureOut">
               <a:rPr lang="en-US" smtClean="0"/>
-              <a:t>6/6/18</a:t>
+              <a:t>10/9/18</a:t>
             </a:fld>
             <a:endParaRPr lang="en-US"/>
           </a:p>
@@ -2252,7 +2252,7 @@
           <a:p>
             <a:fld id="{F86DE704-5A85-4041-9FC6-7273780BCBF6}" type="datetimeFigureOut">
               <a:rPr lang="en-US" smtClean="0"/>
-              <a:t>6/6/18</a:t>
+              <a:t>10/9/18</a:t>
             </a:fld>
             <a:endParaRPr lang="en-US"/>
           </a:p>
@@ -2527,7 +2527,7 @@
           <a:p>
             <a:fld id="{F86DE704-5A85-4041-9FC6-7273780BCBF6}" type="datetimeFigureOut">
               <a:rPr lang="en-US" smtClean="0"/>
-              <a:t>6/6/18</a:t>
+              <a:t>10/9/18</a:t>
             </a:fld>
             <a:endParaRPr lang="en-US"/>
           </a:p>
@@ -2779,7 +2779,7 @@
           <a:p>
             <a:fld id="{F86DE704-5A85-4041-9FC6-7273780BCBF6}" type="datetimeFigureOut">
               <a:rPr lang="en-US" smtClean="0"/>
-              <a:t>6/6/18</a:t>
+              <a:t>10/9/18</a:t>
             </a:fld>
             <a:endParaRPr lang="en-US"/>
           </a:p>
@@ -2990,7 +2990,7 @@
           <a:p>
             <a:fld id="{F86DE704-5A85-4041-9FC6-7273780BCBF6}" type="datetimeFigureOut">
               <a:rPr lang="en-US" smtClean="0"/>
-              <a:t>6/6/18</a:t>
+              <a:t>10/9/18</a:t>
             </a:fld>
             <a:endParaRPr lang="en-US"/>
           </a:p>
@@ -3558,32 +3558,15 @@
           <a:chExt cx="0" cy="0"/>
         </a:xfrm>
       </p:grpSpPr>
-      <p:sp>
-        <p:nvSpPr>
-          <p:cNvPr id="2" name="Title 1"/>
-          <p:cNvSpPr>
-            <a:spLocks noGrp="1"/>
-          </p:cNvSpPr>
-          <p:nvPr>
-            <p:ph type="title"/>
-          </p:nvPr>
-        </p:nvSpPr>
-        <p:spPr/>
-        <p:txBody>
-          <a:bodyPr/>
-          <a:lstStyle/>
-          <a:p>
-            <a:pPr algn="ctr"/>
-            <a:r>
-              <a:rPr lang="en-US" dirty="0"/>
-              <a:t>Being more specific</a:t>
-            </a:r>
-          </a:p>
-        </p:txBody>
-      </p:sp>
       <p:pic>
         <p:nvPicPr>
-          <p:cNvPr id="9" name="Content Placeholder 8"/>
+          <p:cNvPr id="7" name="Content Placeholder 6">
+            <a:extLst>
+              <a:ext uri="{FF2B5EF4-FFF2-40B4-BE49-F238E27FC236}">
+                <a16:creationId xmlns:a16="http://schemas.microsoft.com/office/drawing/2014/main" id="{3B55D429-3220-CC41-B6FB-0B1BDFE443FA}"/>
+              </a:ext>
+            </a:extLst>
+          </p:cNvPr>
           <p:cNvPicPr>
             <a:picLocks noGrp="1" noChangeAspect="1"/>
           </p:cNvPicPr>
@@ -3592,24 +3575,41 @@
           </p:nvPr>
         </p:nvPicPr>
         <p:blipFill>
-          <a:blip r:embed="rId2">
-            <a:extLst>
-              <a:ext uri="{28A0092B-C50C-407E-A947-70E740481C1C}">
-                <a14:useLocalDpi xmlns:a14="http://schemas.microsoft.com/office/drawing/2010/main" val="0"/>
-              </a:ext>
-            </a:extLst>
-          </a:blip>
+          <a:blip r:embed="rId2"/>
           <a:stretch>
             <a:fillRect/>
           </a:stretch>
         </p:blipFill>
         <p:spPr>
           <a:xfrm>
-            <a:off x="838200" y="2186705"/>
-            <a:ext cx="10515600" cy="3629178"/>
+            <a:off x="838200" y="1894790"/>
+            <a:ext cx="10515600" cy="4213007"/>
           </a:xfrm>
         </p:spPr>
       </p:pic>
+      <p:sp>
+        <p:nvSpPr>
+          <p:cNvPr id="2" name="Title 1"/>
+          <p:cNvSpPr>
+            <a:spLocks noGrp="1"/>
+          </p:cNvSpPr>
+          <p:nvPr>
+            <p:ph type="title"/>
+          </p:nvPr>
+        </p:nvSpPr>
+        <p:spPr/>
+        <p:txBody>
+          <a:bodyPr/>
+          <a:lstStyle/>
+          <a:p>
+            <a:pPr algn="ctr"/>
+            <a:r>
+              <a:rPr lang="en-US" dirty="0"/>
+              <a:t>Being more specific</a:t>
+            </a:r>
+          </a:p>
+        </p:txBody>
+      </p:sp>
       <p:pic>
         <p:nvPicPr>
           <p:cNvPr id="4" name="Picture 3"/>
@@ -3695,7 +3695,13 @@
       </p:sp>
       <p:pic>
         <p:nvPicPr>
-          <p:cNvPr id="4" name="Content Placeholder 3"/>
+          <p:cNvPr id="8" name="Content Placeholder 7">
+            <a:extLst>
+              <a:ext uri="{FF2B5EF4-FFF2-40B4-BE49-F238E27FC236}">
+                <a16:creationId xmlns:a16="http://schemas.microsoft.com/office/drawing/2014/main" id="{3E156ADC-DD90-164B-BC8A-1F01762736E5}"/>
+              </a:ext>
+            </a:extLst>
+          </p:cNvPr>
           <p:cNvPicPr>
             <a:picLocks noGrp="1" noChangeAspect="1"/>
           </p:cNvPicPr>
@@ -3704,21 +3710,15 @@
           </p:nvPr>
         </p:nvPicPr>
         <p:blipFill>
-          <a:blip r:embed="rId2">
-            <a:extLst>
-              <a:ext uri="{28A0092B-C50C-407E-A947-70E740481C1C}">
-                <a14:useLocalDpi xmlns:a14="http://schemas.microsoft.com/office/drawing/2010/main" val="0"/>
-              </a:ext>
-            </a:extLst>
-          </a:blip>
+          <a:blip r:embed="rId2"/>
           <a:stretch>
             <a:fillRect/>
           </a:stretch>
         </p:blipFill>
         <p:spPr>
           <a:xfrm>
-            <a:off x="2146300" y="1690688"/>
-            <a:ext cx="7899400" cy="3492500"/>
+            <a:off x="1268396" y="1825625"/>
+            <a:ext cx="9655207" cy="4351338"/>
           </a:xfrm>
         </p:spPr>
       </p:pic>
@@ -3834,7 +3834,15 @@
           <a:p>
             <a:r>
               <a:rPr lang="en-US" dirty="0"/>
-              <a:t>Start with the following code: http://go/0jhl1t2b</a:t>
+              <a:t>Start with the following code: http://</a:t>
+            </a:r>
+            <a:r>
+              <a:rPr lang="en-US" dirty="0" err="1"/>
+              <a:t>eca</a:t>
+            </a:r>
+            <a:r>
+              <a:rPr lang="en-US" dirty="0"/>
+              <a:t>-python/l2session3</a:t>
             </a:r>
           </a:p>
           <a:p>
@@ -3869,60 +3877,30 @@
           </a:p>
         </p:txBody>
       </p:sp>
-      <p:sp>
-        <p:nvSpPr>
-          <p:cNvPr id="6" name="TextBox 5"/>
-          <p:cNvSpPr txBox="1"/>
-          <p:nvPr/>
-        </p:nvSpPr>
-        <p:spPr>
-          <a:xfrm>
-            <a:off x="790532" y="6127234"/>
-            <a:ext cx="10112649" cy="369332"/>
-          </a:xfrm>
-          <a:prstGeom prst="rect">
-            <a:avLst/>
-          </a:prstGeom>
-          <a:noFill/>
-        </p:spPr>
-        <p:txBody>
-          <a:bodyPr wrap="square" rtlCol="0">
-            <a:spAutoFit/>
-          </a:bodyPr>
-          <a:lstStyle/>
-          <a:p>
-            <a:pPr algn="ctr"/>
-            <a:r>
-              <a:rPr lang="en-US" strike="sngStrike" dirty="0"/>
-              <a:t>Questions? Comments? Come see us in S13, on Thursday, 11:00 – 12:00</a:t>
-            </a:r>
-          </a:p>
-        </p:txBody>
-      </p:sp>
       <p:pic>
         <p:nvPicPr>
-          <p:cNvPr id="5" name="Picture 4"/>
+          <p:cNvPr id="8" name="Picture 7">
+            <a:extLst>
+              <a:ext uri="{FF2B5EF4-FFF2-40B4-BE49-F238E27FC236}">
+                <a16:creationId xmlns:a16="http://schemas.microsoft.com/office/drawing/2014/main" id="{BF59D235-AB07-EB41-A4D3-E03C4299AC4B}"/>
+              </a:ext>
+            </a:extLst>
+          </p:cNvPr>
           <p:cNvPicPr>
             <a:picLocks noChangeAspect="1"/>
           </p:cNvPicPr>
           <p:nvPr/>
         </p:nvPicPr>
         <p:blipFill>
-          <a:blip r:embed="rId2">
-            <a:extLst>
-              <a:ext uri="{28A0092B-C50C-407E-A947-70E740481C1C}">
-                <a14:useLocalDpi xmlns:a14="http://schemas.microsoft.com/office/drawing/2010/main" val="0"/>
-              </a:ext>
-            </a:extLst>
-          </a:blip>
+          <a:blip r:embed="rId2"/>
           <a:stretch>
             <a:fillRect/>
           </a:stretch>
         </p:blipFill>
         <p:spPr>
           <a:xfrm>
-            <a:off x="1472215" y="3555906"/>
-            <a:ext cx="8329197" cy="2251725"/>
+            <a:off x="974995" y="3789511"/>
+            <a:ext cx="8689623" cy="2120728"/>
           </a:xfrm>
           <a:prstGeom prst="rect">
             <a:avLst/>
@@ -4017,9 +3995,51 @@
           </a:p>
         </p:txBody>
       </p:sp>
+      <p:sp>
+        <p:nvSpPr>
+          <p:cNvPr id="3" name="TextBox 2"/>
+          <p:cNvSpPr txBox="1"/>
+          <p:nvPr/>
+        </p:nvSpPr>
+        <p:spPr>
+          <a:xfrm>
+            <a:off x="1134708" y="5434855"/>
+            <a:ext cx="8890575" cy="461665"/>
+          </a:xfrm>
+          <a:prstGeom prst="rect">
+            <a:avLst/>
+          </a:prstGeom>
+          <a:noFill/>
+        </p:spPr>
+        <p:txBody>
+          <a:bodyPr wrap="none" rtlCol="0">
+            <a:spAutoFit/>
+          </a:bodyPr>
+          <a:lstStyle/>
+          <a:p>
+            <a:r>
+              <a:rPr lang="en-US" sz="2400" dirty="0"/>
+              <a:t>My completed exercise for last week: </a:t>
+            </a:r>
+            <a:r>
+              <a:rPr lang="en-US" sz="2400" dirty="0">
+                <a:hlinkClick r:id="rId3"/>
+              </a:rPr>
+              <a:t>http://eca-python/l2s2soluction</a:t>
+            </a:r>
+            <a:endParaRPr lang="en-US" sz="2400" dirty="0"/>
+          </a:p>
+        </p:txBody>
+      </p:sp>
       <p:pic>
         <p:nvPicPr>
-          <p:cNvPr id="7" name="Content Placeholder 6"/>
+          <p:cNvPr id="9" name="Content Placeholder 8">
+            <a:extLst>
+              <a:ext uri="{FF2B5EF4-FFF2-40B4-BE49-F238E27FC236}">
+                <a16:creationId xmlns:a16="http://schemas.microsoft.com/office/drawing/2014/main" id="{69201E97-DF69-7B48-9C77-56D4B7C38008}"/>
+              </a:ext>
+            </a:extLst>
+          </p:cNvPr>
           <p:cNvPicPr>
             <a:picLocks noGrp="1" noChangeAspect="1"/>
           </p:cNvPicPr>
@@ -4028,7 +4048,28 @@
           </p:nvPr>
         </p:nvPicPr>
         <p:blipFill>
-          <a:blip r:embed="rId3">
+          <a:blip r:embed="rId4"/>
+          <a:stretch>
+            <a:fillRect/>
+          </a:stretch>
+        </p:blipFill>
+        <p:spPr>
+          <a:xfrm>
+            <a:off x="1493178" y="1690688"/>
+            <a:ext cx="9201347" cy="3390699"/>
+          </a:xfrm>
+        </p:spPr>
+      </p:pic>
+      <p:pic>
+        <p:nvPicPr>
+          <p:cNvPr id="4" name="Picture 3"/>
+          <p:cNvPicPr>
+            <a:picLocks noChangeAspect="1"/>
+          </p:cNvPicPr>
+          <p:nvPr/>
+        </p:nvPicPr>
+        <p:blipFill>
+          <a:blip r:embed="rId5">
             <a:extLst>
               <a:ext uri="{28A0092B-C50C-407E-A947-70E740481C1C}">
                 <a14:useLocalDpi xmlns:a14="http://schemas.microsoft.com/office/drawing/2010/main" val="0"/>
@@ -4041,33 +4082,6 @@
         </p:blipFill>
         <p:spPr>
           <a:xfrm>
-            <a:off x="1358578" y="1690688"/>
-            <a:ext cx="9474843" cy="3463724"/>
-          </a:xfrm>
-        </p:spPr>
-      </p:pic>
-      <p:pic>
-        <p:nvPicPr>
-          <p:cNvPr id="4" name="Picture 3"/>
-          <p:cNvPicPr>
-            <a:picLocks noChangeAspect="1"/>
-          </p:cNvPicPr>
-          <p:nvPr/>
-        </p:nvPicPr>
-        <p:blipFill>
-          <a:blip r:embed="rId4">
-            <a:extLst>
-              <a:ext uri="{28A0092B-C50C-407E-A947-70E740481C1C}">
-                <a14:useLocalDpi xmlns:a14="http://schemas.microsoft.com/office/drawing/2010/main" val="0"/>
-              </a:ext>
-            </a:extLst>
-          </a:blip>
-          <a:stretch>
-            <a:fillRect/>
-          </a:stretch>
-        </p:blipFill>
-        <p:spPr>
-          <a:xfrm>
             <a:off x="9801412" y="4624575"/>
             <a:ext cx="1552388" cy="1552388"/>
           </a:xfrm>
@@ -4076,42 +4090,6 @@
           </a:prstGeom>
         </p:spPr>
       </p:pic>
-      <p:sp>
-        <p:nvSpPr>
-          <p:cNvPr id="3" name="TextBox 2"/>
-          <p:cNvSpPr txBox="1"/>
-          <p:nvPr/>
-        </p:nvSpPr>
-        <p:spPr>
-          <a:xfrm>
-            <a:off x="2494115" y="5434855"/>
-            <a:ext cx="7203767" cy="461665"/>
-          </a:xfrm>
-          <a:prstGeom prst="rect">
-            <a:avLst/>
-          </a:prstGeom>
-          <a:noFill/>
-        </p:spPr>
-        <p:txBody>
-          <a:bodyPr wrap="none" rtlCol="0">
-            <a:spAutoFit/>
-          </a:bodyPr>
-          <a:lstStyle/>
-          <a:p>
-            <a:r>
-              <a:rPr lang="en-US" sz="2400" dirty="0"/>
-              <a:t>My completed exercise for last week: </a:t>
-            </a:r>
-            <a:r>
-              <a:rPr lang="en-US" sz="2400" dirty="0">
-                <a:hlinkClick r:id="rId5"/>
-              </a:rPr>
-              <a:t>http://go/3peilk75</a:t>
-            </a:r>
-            <a:endParaRPr lang="en-US" sz="2400" dirty="0"/>
-          </a:p>
-        </p:txBody>
-      </p:sp>
     </p:spTree>
     <p:extLst>
       <p:ext uri="{BB962C8B-B14F-4D97-AF65-F5344CB8AC3E}">
@@ -4941,11 +4919,13 @@
       </p:sp>
       <p:pic>
         <p:nvPicPr>
-          <p:cNvPr id="3" name="Picture 2"/>
+          <p:cNvPr id="12" name="Content Placeholder 11"/>
           <p:cNvPicPr>
-            <a:picLocks noChangeAspect="1"/>
+            <a:picLocks noGrp="1" noChangeAspect="1"/>
           </p:cNvPicPr>
-          <p:nvPr/>
+          <p:nvPr>
+            <p:ph idx="1"/>
+          </p:nvPr>
         </p:nvPicPr>
         <p:blipFill>
           <a:blip r:embed="rId3">
@@ -4961,41 +4941,39 @@
         </p:blipFill>
         <p:spPr>
           <a:xfrm>
-            <a:off x="4540250" y="3959493"/>
-            <a:ext cx="3111500" cy="1130300"/>
-          </a:xfrm>
-          <a:prstGeom prst="rect">
-            <a:avLst/>
-          </a:prstGeom>
+            <a:off x="754844" y="2174890"/>
+            <a:ext cx="10515600" cy="620053"/>
+          </a:xfrm>
         </p:spPr>
       </p:pic>
       <p:pic>
         <p:nvPicPr>
-          <p:cNvPr id="12" name="Content Placeholder 11"/>
+          <p:cNvPr id="6" name="Picture 5">
+            <a:extLst>
+              <a:ext uri="{FF2B5EF4-FFF2-40B4-BE49-F238E27FC236}">
+                <a16:creationId xmlns:a16="http://schemas.microsoft.com/office/drawing/2014/main" id="{D8CFD904-CB5B-5B47-8FCA-ECE8D7AB07A0}"/>
+              </a:ext>
+            </a:extLst>
+          </p:cNvPr>
           <p:cNvPicPr>
-            <a:picLocks noGrp="1" noChangeAspect="1"/>
+            <a:picLocks noChangeAspect="1"/>
           </p:cNvPicPr>
-          <p:nvPr>
-            <p:ph idx="1"/>
-          </p:nvPr>
+          <p:nvPr/>
         </p:nvPicPr>
         <p:blipFill>
-          <a:blip r:embed="rId4">
-            <a:extLst>
-              <a:ext uri="{28A0092B-C50C-407E-A947-70E740481C1C}">
-                <a14:useLocalDpi xmlns:a14="http://schemas.microsoft.com/office/drawing/2010/main" val="0"/>
-              </a:ext>
-            </a:extLst>
-          </a:blip>
+          <a:blip r:embed="rId4"/>
           <a:stretch>
             <a:fillRect/>
           </a:stretch>
         </p:blipFill>
         <p:spPr>
           <a:xfrm>
-            <a:off x="754844" y="2174890"/>
-            <a:ext cx="10515600" cy="620053"/>
-          </a:xfrm>
+            <a:off x="4221944" y="4339977"/>
+            <a:ext cx="3581400" cy="1193800"/>
+          </a:xfrm>
+          <a:prstGeom prst="rect">
+            <a:avLst/>
+          </a:prstGeom>
         </p:spPr>
       </p:pic>
     </p:spTree>
@@ -5107,7 +5085,7 @@
           <a:p>
             <a:r>
               <a:rPr lang="en-US" dirty="0"/>
-              <a:t>Does print </a:t>
+              <a:t>Does    print </a:t>
             </a:r>
             <a:r>
               <a:rPr lang="en-US" dirty="0" err="1"/>
@@ -5115,7 +5093,7 @@
             </a:r>
             <a:r>
               <a:rPr lang="en-US" dirty="0"/>
-              <a:t>         work now?</a:t>
+              <a:t>      work now?</a:t>
             </a:r>
           </a:p>
         </p:txBody>
@@ -5182,28 +5160,28 @@
       </p:pic>
       <p:pic>
         <p:nvPicPr>
-          <p:cNvPr id="6" name="Picture 5"/>
+          <p:cNvPr id="8" name="Picture 7">
+            <a:extLst>
+              <a:ext uri="{FF2B5EF4-FFF2-40B4-BE49-F238E27FC236}">
+                <a16:creationId xmlns:a16="http://schemas.microsoft.com/office/drawing/2014/main" id="{07E429DF-DD75-234C-AAEB-466BA1740CEE}"/>
+              </a:ext>
+            </a:extLst>
+          </p:cNvPr>
           <p:cNvPicPr>
             <a:picLocks noChangeAspect="1"/>
           </p:cNvPicPr>
           <p:nvPr/>
         </p:nvPicPr>
         <p:blipFill>
-          <a:blip r:embed="rId4">
-            <a:extLst>
-              <a:ext uri="{28A0092B-C50C-407E-A947-70E740481C1C}">
-                <a14:useLocalDpi xmlns:a14="http://schemas.microsoft.com/office/drawing/2010/main" val="0"/>
-              </a:ext>
-            </a:extLst>
-          </a:blip>
+          <a:blip r:embed="rId4"/>
           <a:stretch>
             <a:fillRect/>
           </a:stretch>
         </p:blipFill>
         <p:spPr>
           <a:xfrm>
-            <a:off x="1966910" y="4781772"/>
-            <a:ext cx="2235264" cy="618997"/>
+            <a:off x="2060292" y="4800029"/>
+            <a:ext cx="2009373" cy="600740"/>
           </a:xfrm>
           <a:prstGeom prst="rect">
             <a:avLst/>

</xml_diff>